<commit_message>
Ajout du pdf du rapport
</commit_message>
<xml_diff>
--- a/diagramme-collaboration-demander-positionnement/diagramme-collaboration2.pptx
+++ b/diagramme-collaboration-demander-positionnement/diagramme-collaboration2.pptx
@@ -104,6 +104,11 @@
       </a:defRPr>
     </a:lvl9pPr>
   </p:defaultTextStyle>
+  <p:extLst>
+    <p:ext uri="{EFAFB233-063F-42B5-8137-9DF3F51BA10A}">
+      <p15:sldGuideLst xmlns:p15="http://schemas.microsoft.com/office/powerpoint/2012/main"/>
+    </p:ext>
+  </p:extLst>
 </p:presentation>
 </file>
 
@@ -254,7 +259,7 @@
           <a:p>
             <a:fld id="{6EBDA6C2-0D91-A64D-9123-5CA3C9463F27}" type="datetimeFigureOut">
               <a:rPr lang="fr-FR" smtClean="0"/>
-              <a:t>24/11/2018</a:t>
+              <a:t>27/11/2018</a:t>
             </a:fld>
             <a:endParaRPr lang="fr-FR"/>
           </a:p>
@@ -427,7 +432,7 @@
           <a:p>
             <a:fld id="{6EBDA6C2-0D91-A64D-9123-5CA3C9463F27}" type="datetimeFigureOut">
               <a:rPr lang="fr-FR" smtClean="0"/>
-              <a:t>24/11/2018</a:t>
+              <a:t>27/11/2018</a:t>
             </a:fld>
             <a:endParaRPr lang="fr-FR"/>
           </a:p>
@@ -610,7 +615,7 @@
           <a:p>
             <a:fld id="{6EBDA6C2-0D91-A64D-9123-5CA3C9463F27}" type="datetimeFigureOut">
               <a:rPr lang="fr-FR" smtClean="0"/>
-              <a:t>24/11/2018</a:t>
+              <a:t>27/11/2018</a:t>
             </a:fld>
             <a:endParaRPr lang="fr-FR"/>
           </a:p>
@@ -783,7 +788,7 @@
           <a:p>
             <a:fld id="{6EBDA6C2-0D91-A64D-9123-5CA3C9463F27}" type="datetimeFigureOut">
               <a:rPr lang="fr-FR" smtClean="0"/>
-              <a:t>24/11/2018</a:t>
+              <a:t>27/11/2018</a:t>
             </a:fld>
             <a:endParaRPr lang="fr-FR"/>
           </a:p>
@@ -1061,7 +1066,7 @@
           <a:p>
             <a:fld id="{6EBDA6C2-0D91-A64D-9123-5CA3C9463F27}" type="datetimeFigureOut">
               <a:rPr lang="fr-FR" smtClean="0"/>
-              <a:t>24/11/2018</a:t>
+              <a:t>27/11/2018</a:t>
             </a:fld>
             <a:endParaRPr lang="fr-FR"/>
           </a:p>
@@ -1276,7 +1281,7 @@
           <a:p>
             <a:fld id="{6EBDA6C2-0D91-A64D-9123-5CA3C9463F27}" type="datetimeFigureOut">
               <a:rPr lang="fr-FR" smtClean="0"/>
-              <a:t>24/11/2018</a:t>
+              <a:t>27/11/2018</a:t>
             </a:fld>
             <a:endParaRPr lang="fr-FR"/>
           </a:p>
@@ -1644,7 +1649,7 @@
           <a:p>
             <a:fld id="{6EBDA6C2-0D91-A64D-9123-5CA3C9463F27}" type="datetimeFigureOut">
               <a:rPr lang="fr-FR" smtClean="0"/>
-              <a:t>24/11/2018</a:t>
+              <a:t>27/11/2018</a:t>
             </a:fld>
             <a:endParaRPr lang="fr-FR"/>
           </a:p>
@@ -1785,7 +1790,7 @@
           <a:p>
             <a:fld id="{6EBDA6C2-0D91-A64D-9123-5CA3C9463F27}" type="datetimeFigureOut">
               <a:rPr lang="fr-FR" smtClean="0"/>
-              <a:t>24/11/2018</a:t>
+              <a:t>27/11/2018</a:t>
             </a:fld>
             <a:endParaRPr lang="fr-FR"/>
           </a:p>
@@ -1898,7 +1903,7 @@
           <a:p>
             <a:fld id="{6EBDA6C2-0D91-A64D-9123-5CA3C9463F27}" type="datetimeFigureOut">
               <a:rPr lang="fr-FR" smtClean="0"/>
-              <a:t>24/11/2018</a:t>
+              <a:t>27/11/2018</a:t>
             </a:fld>
             <a:endParaRPr lang="fr-FR"/>
           </a:p>
@@ -2187,7 +2192,7 @@
           <a:p>
             <a:fld id="{6EBDA6C2-0D91-A64D-9123-5CA3C9463F27}" type="datetimeFigureOut">
               <a:rPr lang="fr-FR" smtClean="0"/>
-              <a:t>24/11/2018</a:t>
+              <a:t>27/11/2018</a:t>
             </a:fld>
             <a:endParaRPr lang="fr-FR"/>
           </a:p>
@@ -2478,7 +2483,7 @@
           <a:p>
             <a:fld id="{6EBDA6C2-0D91-A64D-9123-5CA3C9463F27}" type="datetimeFigureOut">
               <a:rPr lang="fr-FR" smtClean="0"/>
-              <a:t>24/11/2018</a:t>
+              <a:t>27/11/2018</a:t>
             </a:fld>
             <a:endParaRPr lang="fr-FR"/>
           </a:p>
@@ -2694,7 +2699,7 @@
           <a:p>
             <a:fld id="{6EBDA6C2-0D91-A64D-9123-5CA3C9463F27}" type="datetimeFigureOut">
               <a:rPr lang="fr-FR" smtClean="0"/>
-              <a:t>24/11/2018</a:t>
+              <a:t>27/11/2018</a:t>
             </a:fld>
             <a:endParaRPr lang="fr-FR"/>
           </a:p>
@@ -3172,65 +3177,6 @@
       </p:sp>
       <p:sp>
         <p:nvSpPr>
-          <p:cNvPr id="6" name="Rectangle : coins arrondis 5">
-            <a:extLst>
-              <a:ext uri="{FF2B5EF4-FFF2-40B4-BE49-F238E27FC236}">
-                <a16:creationId xmlns:a16="http://schemas.microsoft.com/office/drawing/2014/main" id="{2E8755E8-AEE0-8646-8E6F-C11AA143BC46}"/>
-              </a:ext>
-            </a:extLst>
-          </p:cNvPr>
-          <p:cNvSpPr/>
-          <p:nvPr/>
-        </p:nvSpPr>
-        <p:spPr>
-          <a:xfrm>
-            <a:off x="9074334" y="1765664"/>
-            <a:ext cx="1724297" cy="744582"/>
-          </a:xfrm>
-          <a:prstGeom prst="roundRect">
-            <a:avLst/>
-          </a:prstGeom>
-          <a:noFill/>
-          <a:ln>
-            <a:solidFill>
-              <a:schemeClr val="tx1"/>
-            </a:solidFill>
-          </a:ln>
-        </p:spPr>
-        <p:style>
-          <a:lnRef idx="2">
-            <a:schemeClr val="accent1">
-              <a:shade val="50000"/>
-            </a:schemeClr>
-          </a:lnRef>
-          <a:fillRef idx="1">
-            <a:schemeClr val="accent1"/>
-          </a:fillRef>
-          <a:effectRef idx="0">
-            <a:schemeClr val="accent1"/>
-          </a:effectRef>
-          <a:fontRef idx="minor">
-            <a:schemeClr val="lt1"/>
-          </a:fontRef>
-        </p:style>
-        <p:txBody>
-          <a:bodyPr rtlCol="0" anchor="ctr"/>
-          <a:lstStyle/>
-          <a:p>
-            <a:pPr algn="ctr"/>
-            <a:r>
-              <a:rPr lang="fr-FR" dirty="0">
-                <a:solidFill>
-                  <a:sysClr val="windowText" lastClr="000000"/>
-                </a:solidFill>
-              </a:rPr>
-              <a:t>ESA</a:t>
-            </a:r>
-          </a:p>
-        </p:txBody>
-      </p:sp>
-      <p:sp>
-        <p:nvSpPr>
           <p:cNvPr id="7" name="Rectangle : coins arrondis 6">
             <a:extLst>
               <a:ext uri="{FF2B5EF4-FFF2-40B4-BE49-F238E27FC236}">
@@ -3302,7 +3248,7 @@
         </p:nvSpPr>
         <p:spPr>
           <a:xfrm>
-            <a:off x="5090158" y="4323807"/>
+            <a:off x="9074334" y="1789612"/>
             <a:ext cx="1724297" cy="744582"/>
           </a:xfrm>
           <a:prstGeom prst="roundRect">
@@ -3362,100 +3308,6 @@
         <p:spPr>
           <a:xfrm>
             <a:off x="3794757" y="2023110"/>
-            <a:ext cx="330926" cy="277586"/>
-          </a:xfrm>
-          <a:prstGeom prst="hexagon">
-            <a:avLst/>
-          </a:prstGeom>
-          <a:noFill/>
-        </p:spPr>
-        <p:style>
-          <a:lnRef idx="2">
-            <a:schemeClr val="dk1">
-              <a:shade val="50000"/>
-            </a:schemeClr>
-          </a:lnRef>
-          <a:fillRef idx="1">
-            <a:schemeClr val="dk1"/>
-          </a:fillRef>
-          <a:effectRef idx="0">
-            <a:schemeClr val="dk1"/>
-          </a:effectRef>
-          <a:fontRef idx="minor">
-            <a:schemeClr val="lt1"/>
-          </a:fontRef>
-        </p:style>
-        <p:txBody>
-          <a:bodyPr rtlCol="0" anchor="ctr"/>
-          <a:lstStyle/>
-          <a:p>
-            <a:pPr algn="ctr"/>
-            <a:endParaRPr lang="fr-FR" dirty="0"/>
-          </a:p>
-        </p:txBody>
-      </p:sp>
-      <p:sp>
-        <p:nvSpPr>
-          <p:cNvPr id="10" name="Hexagone 9">
-            <a:extLst>
-              <a:ext uri="{FF2B5EF4-FFF2-40B4-BE49-F238E27FC236}">
-                <a16:creationId xmlns:a16="http://schemas.microsoft.com/office/drawing/2014/main" id="{BB861F86-F840-134E-B90F-156FEB332682}"/>
-              </a:ext>
-            </a:extLst>
-          </p:cNvPr>
-          <p:cNvSpPr/>
-          <p:nvPr/>
-        </p:nvSpPr>
-        <p:spPr>
-          <a:xfrm>
-            <a:off x="7778933" y="1999162"/>
-            <a:ext cx="330926" cy="277586"/>
-          </a:xfrm>
-          <a:prstGeom prst="hexagon">
-            <a:avLst/>
-          </a:prstGeom>
-          <a:noFill/>
-        </p:spPr>
-        <p:style>
-          <a:lnRef idx="2">
-            <a:schemeClr val="dk1">
-              <a:shade val="50000"/>
-            </a:schemeClr>
-          </a:lnRef>
-          <a:fillRef idx="1">
-            <a:schemeClr val="dk1"/>
-          </a:fillRef>
-          <a:effectRef idx="0">
-            <a:schemeClr val="dk1"/>
-          </a:effectRef>
-          <a:fontRef idx="minor">
-            <a:schemeClr val="lt1"/>
-          </a:fontRef>
-        </p:style>
-        <p:txBody>
-          <a:bodyPr rtlCol="0" anchor="ctr"/>
-          <a:lstStyle/>
-          <a:p>
-            <a:pPr algn="ctr"/>
-            <a:endParaRPr lang="fr-FR" dirty="0"/>
-          </a:p>
-        </p:txBody>
-      </p:sp>
-      <p:sp>
-        <p:nvSpPr>
-          <p:cNvPr id="11" name="Hexagone 10">
-            <a:extLst>
-              <a:ext uri="{FF2B5EF4-FFF2-40B4-BE49-F238E27FC236}">
-                <a16:creationId xmlns:a16="http://schemas.microsoft.com/office/drawing/2014/main" id="{BCCF4272-95FF-1E4E-AC1B-75C976676C78}"/>
-              </a:ext>
-            </a:extLst>
-          </p:cNvPr>
-          <p:cNvSpPr/>
-          <p:nvPr/>
-        </p:nvSpPr>
-        <p:spPr>
-          <a:xfrm>
-            <a:off x="5786843" y="3290208"/>
             <a:ext cx="330926" cy="277586"/>
           </a:xfrm>
           <a:prstGeom prst="hexagon">
@@ -3563,21 +3415,174 @@
           </a:fontRef>
         </p:style>
       </p:cxnSp>
+      <p:sp>
+        <p:nvSpPr>
+          <p:cNvPr id="26" name="ZoneTexte 25">
+            <a:extLst>
+              <a:ext uri="{FF2B5EF4-FFF2-40B4-BE49-F238E27FC236}">
+                <a16:creationId xmlns:a16="http://schemas.microsoft.com/office/drawing/2014/main" id="{65FF10EF-34A6-D14D-A2DD-9416DEC6C456}"/>
+              </a:ext>
+            </a:extLst>
+          </p:cNvPr>
+          <p:cNvSpPr txBox="1"/>
+          <p:nvPr/>
+        </p:nvSpPr>
+        <p:spPr>
+          <a:xfrm>
+            <a:off x="2198912" y="1397514"/>
+            <a:ext cx="3522616" cy="584775"/>
+          </a:xfrm>
+          <a:prstGeom prst="rect">
+            <a:avLst/>
+          </a:prstGeom>
+          <a:noFill/>
+        </p:spPr>
+        <p:txBody>
+          <a:bodyPr wrap="square" rtlCol="0">
+            <a:spAutoFit/>
+          </a:bodyPr>
+          <a:lstStyle/>
+          <a:p>
+            <a:pPr algn="ctr"/>
+            <a:r>
+              <a:rPr lang="fr-FR" sz="1600" dirty="0">
+                <a:effectLst/>
+              </a:rPr>
+              <a:t>ENVOIE_INFORMATIONS_BANCAIRES</a:t>
+            </a:r>
+          </a:p>
+          <a:p>
+            <a:pPr algn="ctr"/>
+            <a:r>
+              <a:rPr lang="fr-FR" sz="1600" dirty="0">
+                <a:effectLst/>
+              </a:rPr>
+              <a:t>VALIDER PAIEMENT</a:t>
+            </a:r>
+          </a:p>
+        </p:txBody>
+      </p:sp>
+      <p:sp>
+        <p:nvSpPr>
+          <p:cNvPr id="27" name="ZoneTexte 26">
+            <a:extLst>
+              <a:ext uri="{FF2B5EF4-FFF2-40B4-BE49-F238E27FC236}">
+                <a16:creationId xmlns:a16="http://schemas.microsoft.com/office/drawing/2014/main" id="{E0C4B376-EA73-584A-BF17-3EC0665B0F98}"/>
+              </a:ext>
+            </a:extLst>
+          </p:cNvPr>
+          <p:cNvSpPr txBox="1"/>
+          <p:nvPr/>
+        </p:nvSpPr>
+        <p:spPr>
+          <a:xfrm>
+            <a:off x="6876715" y="2521131"/>
+            <a:ext cx="2135360" cy="1077218"/>
+          </a:xfrm>
+          <a:prstGeom prst="rect">
+            <a:avLst/>
+          </a:prstGeom>
+          <a:noFill/>
+        </p:spPr>
+        <p:txBody>
+          <a:bodyPr wrap="square" rtlCol="0">
+            <a:spAutoFit/>
+          </a:bodyPr>
+          <a:lstStyle/>
+          <a:p>
+            <a:pPr algn="ctr"/>
+            <a:r>
+              <a:rPr lang="fr-FR" sz="1600" dirty="0"/>
+              <a:t>PROPOSER_SURNOM</a:t>
+            </a:r>
+            <a:endParaRPr lang="fr-FR" sz="1600" dirty="0">
+              <a:effectLst/>
+            </a:endParaRPr>
+          </a:p>
+          <a:p>
+            <a:pPr algn="ctr"/>
+            <a:r>
+              <a:rPr lang="fr-FR" sz="1600" dirty="0"/>
+              <a:t>VALIDER_SURNOM</a:t>
+            </a:r>
+          </a:p>
+          <a:p>
+            <a:pPr algn="ctr"/>
+            <a:r>
+              <a:rPr lang="fr-FR" sz="1600" dirty="0"/>
+              <a:t>INVALIDER_SURNOM</a:t>
+            </a:r>
+          </a:p>
+          <a:p>
+            <a:pPr algn="ctr"/>
+            <a:endParaRPr lang="fr-FR" sz="1600" dirty="0"/>
+          </a:p>
+        </p:txBody>
+      </p:sp>
+      <p:sp>
+        <p:nvSpPr>
+          <p:cNvPr id="21" name="Hexagone 20">
+            <a:extLst>
+              <a:ext uri="{FF2B5EF4-FFF2-40B4-BE49-F238E27FC236}">
+                <a16:creationId xmlns:a16="http://schemas.microsoft.com/office/drawing/2014/main" id="{5E89948D-AA20-BA44-8F8B-0F151A2925AB}"/>
+              </a:ext>
+            </a:extLst>
+          </p:cNvPr>
+          <p:cNvSpPr/>
+          <p:nvPr/>
+        </p:nvSpPr>
+        <p:spPr>
+          <a:xfrm>
+            <a:off x="7778932" y="2024743"/>
+            <a:ext cx="330926" cy="277586"/>
+          </a:xfrm>
+          <a:prstGeom prst="hexagon">
+            <a:avLst/>
+          </a:prstGeom>
+          <a:noFill/>
+        </p:spPr>
+        <p:style>
+          <a:lnRef idx="2">
+            <a:schemeClr val="dk1">
+              <a:shade val="50000"/>
+            </a:schemeClr>
+          </a:lnRef>
+          <a:fillRef idx="1">
+            <a:schemeClr val="dk1"/>
+          </a:fillRef>
+          <a:effectRef idx="0">
+            <a:schemeClr val="dk1"/>
+          </a:effectRef>
+          <a:fontRef idx="minor">
+            <a:schemeClr val="lt1"/>
+          </a:fontRef>
+        </p:style>
+        <p:txBody>
+          <a:bodyPr rtlCol="0" anchor="ctr"/>
+          <a:lstStyle/>
+          <a:p>
+            <a:pPr algn="ctr"/>
+            <a:endParaRPr lang="fr-FR" dirty="0"/>
+          </a:p>
+        </p:txBody>
+      </p:sp>
       <p:cxnSp>
         <p:nvCxnSpPr>
-          <p:cNvPr id="15" name="Connecteur droit 14">
-            <a:extLst>
-              <a:ext uri="{FF2B5EF4-FFF2-40B4-BE49-F238E27FC236}">
-                <a16:creationId xmlns:a16="http://schemas.microsoft.com/office/drawing/2014/main" id="{E8582759-3213-EB46-B7C2-9D7B2E25CE38}"/>
-              </a:ext>
-            </a:extLst>
-          </p:cNvPr>
-          <p:cNvCxnSpPr/>
+          <p:cNvPr id="22" name="Connecteur droit 21">
+            <a:extLst>
+              <a:ext uri="{FF2B5EF4-FFF2-40B4-BE49-F238E27FC236}">
+                <a16:creationId xmlns:a16="http://schemas.microsoft.com/office/drawing/2014/main" id="{0B0809CC-1EF1-BC47-AB6C-2F31AC520B88}"/>
+              </a:ext>
+            </a:extLst>
+          </p:cNvPr>
+          <p:cNvCxnSpPr>
+            <a:endCxn id="21" idx="3"/>
+          </p:cNvCxnSpPr>
           <p:nvPr/>
         </p:nvCxnSpPr>
         <p:spPr>
           <a:xfrm>
-            <a:off x="6814455" y="2137955"/>
+            <a:off x="6814456" y="2163536"/>
             <a:ext cx="964476" cy="0"/>
           </a:xfrm>
           <a:prstGeom prst="line">
@@ -3601,24 +3606,20 @@
       </p:cxnSp>
       <p:cxnSp>
         <p:nvCxnSpPr>
-          <p:cNvPr id="16" name="Connecteur droit 15">
-            <a:extLst>
-              <a:ext uri="{FF2B5EF4-FFF2-40B4-BE49-F238E27FC236}">
-                <a16:creationId xmlns:a16="http://schemas.microsoft.com/office/drawing/2014/main" id="{141EC1A2-21E6-8B44-B908-B2476734EF67}"/>
-              </a:ext>
-            </a:extLst>
-          </p:cNvPr>
-          <p:cNvCxnSpPr>
-            <a:cxnSpLocks/>
-            <a:stCxn id="10" idx="0"/>
-            <a:endCxn id="6" idx="1"/>
-          </p:cNvCxnSpPr>
+          <p:cNvPr id="23" name="Connecteur droit 22">
+            <a:extLst>
+              <a:ext uri="{FF2B5EF4-FFF2-40B4-BE49-F238E27FC236}">
+                <a16:creationId xmlns:a16="http://schemas.microsoft.com/office/drawing/2014/main" id="{CD5A621B-FE06-EB4D-BE53-52F161AE5E07}"/>
+              </a:ext>
+            </a:extLst>
+          </p:cNvPr>
+          <p:cNvCxnSpPr/>
           <p:nvPr/>
         </p:nvCxnSpPr>
         <p:spPr>
           <a:xfrm>
-            <a:off x="8109859" y="2137955"/>
-            <a:ext cx="964475" cy="0"/>
+            <a:off x="8109858" y="2163536"/>
+            <a:ext cx="964476" cy="0"/>
           </a:xfrm>
           <a:prstGeom prst="line">
             <a:avLst/>
@@ -3639,99 +3640,22 @@
           </a:fontRef>
         </p:style>
       </p:cxnSp>
-      <p:cxnSp>
-        <p:nvCxnSpPr>
-          <p:cNvPr id="20" name="Connecteur droit 19">
-            <a:extLst>
-              <a:ext uri="{FF2B5EF4-FFF2-40B4-BE49-F238E27FC236}">
-                <a16:creationId xmlns:a16="http://schemas.microsoft.com/office/drawing/2014/main" id="{481BAD28-1D21-1542-959A-5198623F1DA5}"/>
-              </a:ext>
-            </a:extLst>
-          </p:cNvPr>
-          <p:cNvCxnSpPr>
-            <a:cxnSpLocks/>
-            <a:stCxn id="5" idx="2"/>
-          </p:cNvCxnSpPr>
+      <p:sp>
+        <p:nvSpPr>
+          <p:cNvPr id="24" name="ZoneTexte 23">
+            <a:extLst>
+              <a:ext uri="{FF2B5EF4-FFF2-40B4-BE49-F238E27FC236}">
+                <a16:creationId xmlns:a16="http://schemas.microsoft.com/office/drawing/2014/main" id="{64CAF800-FF48-5640-8CD1-E36E027A1D3D}"/>
+              </a:ext>
+            </a:extLst>
+          </p:cNvPr>
+          <p:cNvSpPr txBox="1"/>
           <p:nvPr/>
-        </p:nvCxnSpPr>
+        </p:nvSpPr>
         <p:spPr>
           <a:xfrm>
-            <a:off x="5952308" y="2534194"/>
-            <a:ext cx="4355" cy="744583"/>
-          </a:xfrm>
-          <a:prstGeom prst="line">
-            <a:avLst/>
-          </a:prstGeom>
-        </p:spPr>
-        <p:style>
-          <a:lnRef idx="1">
-            <a:schemeClr val="dk1"/>
-          </a:lnRef>
-          <a:fillRef idx="0">
-            <a:schemeClr val="dk1"/>
-          </a:fillRef>
-          <a:effectRef idx="0">
-            <a:schemeClr val="dk1"/>
-          </a:effectRef>
-          <a:fontRef idx="minor">
-            <a:schemeClr val="tx1"/>
-          </a:fontRef>
-        </p:style>
-      </p:cxnSp>
-      <p:cxnSp>
-        <p:nvCxnSpPr>
-          <p:cNvPr id="25" name="Connecteur droit 24">
-            <a:extLst>
-              <a:ext uri="{FF2B5EF4-FFF2-40B4-BE49-F238E27FC236}">
-                <a16:creationId xmlns:a16="http://schemas.microsoft.com/office/drawing/2014/main" id="{28476AFF-F1A6-2F4F-ABE2-E9087B7702D7}"/>
-              </a:ext>
-            </a:extLst>
-          </p:cNvPr>
-          <p:cNvCxnSpPr>
-            <a:cxnSpLocks/>
-          </p:cNvCxnSpPr>
-          <p:nvPr/>
-        </p:nvCxnSpPr>
-        <p:spPr>
-          <a:xfrm>
-            <a:off x="5947951" y="3566161"/>
-            <a:ext cx="4355" cy="744583"/>
-          </a:xfrm>
-          <a:prstGeom prst="line">
-            <a:avLst/>
-          </a:prstGeom>
-        </p:spPr>
-        <p:style>
-          <a:lnRef idx="1">
-            <a:schemeClr val="dk1"/>
-          </a:lnRef>
-          <a:fillRef idx="0">
-            <a:schemeClr val="dk1"/>
-          </a:fillRef>
-          <a:effectRef idx="0">
-            <a:schemeClr val="dk1"/>
-          </a:effectRef>
-          <a:fontRef idx="minor">
-            <a:schemeClr val="tx1"/>
-          </a:fontRef>
-        </p:style>
-      </p:cxnSp>
-      <p:sp>
-        <p:nvSpPr>
-          <p:cNvPr id="26" name="ZoneTexte 25">
-            <a:extLst>
-              <a:ext uri="{FF2B5EF4-FFF2-40B4-BE49-F238E27FC236}">
-                <a16:creationId xmlns:a16="http://schemas.microsoft.com/office/drawing/2014/main" id="{65FF10EF-34A6-D14D-A2DD-9416DEC6C456}"/>
-              </a:ext>
-            </a:extLst>
-          </p:cNvPr>
-          <p:cNvSpPr txBox="1"/>
-          <p:nvPr/>
-        </p:nvSpPr>
-        <p:spPr>
-          <a:xfrm>
-            <a:off x="3025529" y="1614983"/>
-            <a:ext cx="1869381" cy="369332"/>
+            <a:off x="2403566" y="2521131"/>
+            <a:ext cx="3291839" cy="369332"/>
           </a:xfrm>
           <a:prstGeom prst="rect">
             <a:avLst/>
@@ -3746,149 +3670,16 @@
           <a:p>
             <a:pPr algn="ctr"/>
             <a:r>
-              <a:rPr lang="fr-FR" dirty="0"/>
-              <a:t>ACHAT_SURNOM</a:t>
+              <a:rPr lang="fr-FR" sz="1600" dirty="0">
+                <a:effectLst/>
+              </a:rPr>
+              <a:t>INFORMATIONS</a:t>
             </a:r>
-            <a:endParaRPr lang="fr-FR" dirty="0">
-              <a:effectLst/>
-            </a:endParaRPr>
-          </a:p>
-        </p:txBody>
-      </p:sp>
-      <p:sp>
-        <p:nvSpPr>
-          <p:cNvPr id="27" name="ZoneTexte 26">
-            <a:extLst>
-              <a:ext uri="{FF2B5EF4-FFF2-40B4-BE49-F238E27FC236}">
-                <a16:creationId xmlns:a16="http://schemas.microsoft.com/office/drawing/2014/main" id="{E0C4B376-EA73-584A-BF17-3EC0665B0F98}"/>
-              </a:ext>
-            </a:extLst>
-          </p:cNvPr>
-          <p:cNvSpPr txBox="1"/>
-          <p:nvPr/>
-        </p:nvSpPr>
-        <p:spPr>
-          <a:xfrm>
-            <a:off x="3361516" y="3105834"/>
-            <a:ext cx="2135360" cy="584775"/>
-          </a:xfrm>
-          <a:prstGeom prst="rect">
-            <a:avLst/>
-          </a:prstGeom>
-          <a:noFill/>
-        </p:spPr>
-        <p:txBody>
-          <a:bodyPr wrap="square" rtlCol="0">
-            <a:spAutoFit/>
-          </a:bodyPr>
-          <a:lstStyle/>
-          <a:p>
-            <a:pPr algn="r"/>
             <a:r>
-              <a:rPr lang="fr-FR" sz="1600" dirty="0"/>
-              <a:t>PROPOSER_SURNOM</a:t>
-            </a:r>
-            <a:endParaRPr lang="fr-FR" sz="1600" dirty="0">
-              <a:effectLst/>
-            </a:endParaRPr>
-          </a:p>
-          <a:p>
-            <a:pPr algn="r"/>
-            <a:r>
-              <a:rPr lang="fr-FR" sz="1600" dirty="0"/>
-              <a:t>VALIDER_SURNOM</a:t>
-            </a:r>
-          </a:p>
-        </p:txBody>
-      </p:sp>
-      <p:sp>
-        <p:nvSpPr>
-          <p:cNvPr id="28" name="ZoneTexte 27">
-            <a:extLst>
-              <a:ext uri="{FF2B5EF4-FFF2-40B4-BE49-F238E27FC236}">
-                <a16:creationId xmlns:a16="http://schemas.microsoft.com/office/drawing/2014/main" id="{E283748D-2837-5145-A46B-8C2BFF26EBE1}"/>
-              </a:ext>
-            </a:extLst>
-          </p:cNvPr>
-          <p:cNvSpPr txBox="1"/>
-          <p:nvPr/>
-        </p:nvSpPr>
-        <p:spPr>
-          <a:xfrm>
-            <a:off x="6040485" y="1243149"/>
-            <a:ext cx="4118966" cy="523220"/>
-          </a:xfrm>
-          <a:prstGeom prst="rect">
-            <a:avLst/>
-          </a:prstGeom>
-          <a:noFill/>
-        </p:spPr>
-        <p:txBody>
-          <a:bodyPr wrap="square" rtlCol="0">
-            <a:spAutoFit/>
-          </a:bodyPr>
-          <a:lstStyle/>
-          <a:p>
-            <a:pPr algn="ctr"/>
-            <a:r>
-              <a:rPr lang="fr-FR" sz="1400" dirty="0"/>
-              <a:t>INTERNAUTE_NAVIGUE_OBJETS_CELESTES</a:t>
-            </a:r>
-            <a:endParaRPr lang="fr-FR" sz="1400" dirty="0">
-              <a:effectLst/>
-            </a:endParaRPr>
-          </a:p>
-          <a:p>
-            <a:pPr algn="ctr"/>
-            <a:r>
-              <a:rPr lang="fr-FR" sz="1400" dirty="0"/>
-              <a:t>AFFICHER_OBJET_CELESTE</a:t>
-            </a:r>
-          </a:p>
-        </p:txBody>
-      </p:sp>
-      <p:sp>
-        <p:nvSpPr>
-          <p:cNvPr id="29" name="ZoneTexte 28">
-            <a:extLst>
-              <a:ext uri="{FF2B5EF4-FFF2-40B4-BE49-F238E27FC236}">
-                <a16:creationId xmlns:a16="http://schemas.microsoft.com/office/drawing/2014/main" id="{0EE770AA-D51B-B342-B30A-AC1C6A546AAC}"/>
-              </a:ext>
-            </a:extLst>
-          </p:cNvPr>
-          <p:cNvSpPr txBox="1"/>
-          <p:nvPr/>
-        </p:nvSpPr>
-        <p:spPr>
-          <a:xfrm>
-            <a:off x="6877102" y="2483578"/>
-            <a:ext cx="2134587" cy="523220"/>
-          </a:xfrm>
-          <a:prstGeom prst="rect">
-            <a:avLst/>
-          </a:prstGeom>
-          <a:noFill/>
-        </p:spPr>
-        <p:txBody>
-          <a:bodyPr wrap="square" rtlCol="0">
-            <a:spAutoFit/>
-          </a:bodyPr>
-          <a:lstStyle/>
-          <a:p>
-            <a:pPr algn="ctr"/>
-            <a:r>
-              <a:rPr lang="fr-FR" sz="1400" dirty="0"/>
-              <a:t>DONNER_SURNOM</a:t>
-            </a:r>
-            <a:endParaRPr lang="fr-FR" sz="1400" dirty="0">
-              <a:effectLst/>
-            </a:endParaRPr>
-          </a:p>
-          <a:p>
-            <a:pPr algn="ctr"/>
-            <a:r>
-              <a:rPr lang="fr-FR" sz="1400" dirty="0"/>
-              <a:t>ESA_INSCRIT_SURNOM</a:t>
+              <a:rPr lang="fr-FR" dirty="0">
+                <a:effectLst/>
+              </a:rPr>
+              <a:t>_INVALIDEES</a:t>
             </a:r>
           </a:p>
         </p:txBody>

</xml_diff>